<commit_message>
Update 2020 ASPE Recognitions...pptx
</commit_message>
<xml_diff>
--- a/2020 ASPE Recognitions...pptx
+++ b/2020 ASPE Recognitions...pptx
@@ -5,7 +5,7 @@
     <p:sldMasterId id="2147483653" r:id="rId1"/>
   </p:sldMasterIdLst>
   <p:notesMasterIdLst>
-    <p:notesMasterId r:id="rId11"/>
+    <p:notesMasterId r:id="rId10"/>
   </p:notesMasterIdLst>
   <p:sldIdLst>
     <p:sldId id="258" r:id="rId2"/>
@@ -15,22 +15,21 @@
     <p:sldId id="260" r:id="rId6"/>
     <p:sldId id="261" r:id="rId7"/>
     <p:sldId id="262" r:id="rId8"/>
-    <p:sldId id="263" r:id="rId9"/>
-    <p:sldId id="264" r:id="rId10"/>
+    <p:sldId id="264" r:id="rId9"/>
   </p:sldIdLst>
   <p:sldSz cx="9144000" cy="5143500" type="screen16x9"/>
   <p:notesSz cx="6858000" cy="9144000"/>
   <p:embeddedFontLst>
     <p:embeddedFont>
       <p:font typeface="Arial Black" panose="020B0A04020102020204" pitchFamily="34" charset="0"/>
-      <p:bold r:id="rId12"/>
+      <p:bold r:id="rId11"/>
     </p:embeddedFont>
     <p:embeddedFont>
       <p:font typeface="Roboto" panose="020B0604020202020204" charset="0"/>
-      <p:regular r:id="rId13"/>
-      <p:bold r:id="rId14"/>
-      <p:italic r:id="rId15"/>
-      <p:boldItalic r:id="rId16"/>
+      <p:regular r:id="rId12"/>
+      <p:bold r:id="rId13"/>
+      <p:italic r:id="rId14"/>
+      <p:boldItalic r:id="rId15"/>
     </p:embeddedFont>
   </p:embeddedFontLst>
   <p:defaultTextStyle>
@@ -5841,270 +5840,6 @@
       </p:grpSpPr>
       <p:sp>
         <p:nvSpPr>
-          <p:cNvPr id="2" name="Title 1">
-            <a:extLst>
-              <a:ext uri="{FF2B5EF4-FFF2-40B4-BE49-F238E27FC236}">
-                <a16:creationId xmlns:a16="http://schemas.microsoft.com/office/drawing/2014/main" id="{A0F575D1-3E02-4809-8DE6-5F9BA6C885C5}"/>
-              </a:ext>
-            </a:extLst>
-          </p:cNvPr>
-          <p:cNvSpPr>
-            <a:spLocks noGrp="1"/>
-          </p:cNvSpPr>
-          <p:nvPr>
-            <p:ph type="ctrTitle"/>
-          </p:nvPr>
-        </p:nvSpPr>
-        <p:spPr>
-          <a:xfrm>
-            <a:off x="3871282" y="403400"/>
-            <a:ext cx="4961018" cy="648787"/>
-          </a:xfrm>
-        </p:spPr>
-        <p:txBody>
-          <a:bodyPr/>
-          <a:lstStyle/>
-          <a:p>
-            <a:r>
-              <a:rPr lang="en-US" dirty="0"/>
-              <a:t>Organizing Committee:</a:t>
-            </a:r>
-          </a:p>
-        </p:txBody>
-      </p:sp>
-      <p:sp>
-        <p:nvSpPr>
-          <p:cNvPr id="3" name="Subtitle 2">
-            <a:extLst>
-              <a:ext uri="{FF2B5EF4-FFF2-40B4-BE49-F238E27FC236}">
-                <a16:creationId xmlns:a16="http://schemas.microsoft.com/office/drawing/2014/main" id="{E86AAB3B-8D7E-43A1-AD34-AD8259A6676E}"/>
-              </a:ext>
-            </a:extLst>
-          </p:cNvPr>
-          <p:cNvSpPr>
-            <a:spLocks noGrp="1"/>
-          </p:cNvSpPr>
-          <p:nvPr>
-            <p:ph type="subTitle" idx="1"/>
-          </p:nvPr>
-        </p:nvSpPr>
-        <p:spPr>
-          <a:xfrm>
-            <a:off x="311700" y="1180377"/>
-            <a:ext cx="8520600" cy="3461300"/>
-          </a:xfrm>
-        </p:spPr>
-        <p:txBody>
-          <a:bodyPr/>
-          <a:lstStyle/>
-          <a:p>
-            <a:pPr lvl="1"/>
-            <a:r>
-              <a:rPr lang="en-US" sz="1600" dirty="0"/>
-              <a:t>Luis A. Aguirre, 3M Company</a:t>
-            </a:r>
-          </a:p>
-          <a:p>
-            <a:pPr lvl="1"/>
-            <a:r>
-              <a:rPr lang="en-US" sz="1600" dirty="0"/>
-              <a:t>Kumar Arumugam, University of North Carolina-Charlotte</a:t>
-            </a:r>
-          </a:p>
-          <a:p>
-            <a:pPr lvl="1"/>
-            <a:r>
-              <a:rPr lang="en-US" sz="1600" dirty="0"/>
-              <a:t>Marcin </a:t>
-            </a:r>
-            <a:r>
-              <a:rPr lang="en-US" sz="1600" dirty="0" err="1"/>
-              <a:t>Bauza</a:t>
-            </a:r>
-            <a:r>
-              <a:rPr lang="en-US" sz="1600" dirty="0"/>
-              <a:t>, ZEISS Industrial Quality Solutions</a:t>
-            </a:r>
-          </a:p>
-          <a:p>
-            <a:pPr lvl="1"/>
-            <a:r>
-              <a:rPr lang="en-US" sz="1600" dirty="0"/>
-              <a:t>Raymond C. Cady, Corning</a:t>
-            </a:r>
-          </a:p>
-          <a:p>
-            <a:pPr lvl="1"/>
-            <a:r>
-              <a:rPr lang="en-US" sz="1600" dirty="0"/>
-              <a:t>Jacob Cole, University of North Carolina-Charlotte</a:t>
-            </a:r>
-          </a:p>
-          <a:p>
-            <a:pPr lvl="1"/>
-            <a:r>
-              <a:rPr lang="en-US" sz="1600" dirty="0"/>
-              <a:t>Tim Dalrymple, Independent</a:t>
-            </a:r>
-          </a:p>
-          <a:p>
-            <a:pPr lvl="1"/>
-            <a:r>
-              <a:rPr lang="en-US" sz="1600" dirty="0"/>
-              <a:t>Mark Kosmowski, ESI</a:t>
-            </a:r>
-          </a:p>
-          <a:p>
-            <a:pPr lvl="1"/>
-            <a:r>
-              <a:rPr lang="en-US" sz="1600" dirty="0"/>
-              <a:t>Byron Knapp, Professional Instruments Company</a:t>
-            </a:r>
-          </a:p>
-          <a:p>
-            <a:pPr lvl="1"/>
-            <a:r>
-              <a:rPr lang="en-US" sz="1600" dirty="0"/>
-              <a:t>Rafael Marangoni, NIST</a:t>
-            </a:r>
-          </a:p>
-          <a:p>
-            <a:pPr lvl="1"/>
-            <a:r>
-              <a:rPr lang="en-US" sz="1600" dirty="0"/>
-              <a:t>Robert </a:t>
-            </a:r>
-            <a:r>
-              <a:rPr lang="en-US" sz="1600" dirty="0" err="1"/>
-              <a:t>Panas</a:t>
-            </a:r>
-            <a:r>
-              <a:rPr lang="en-US" sz="1600" dirty="0"/>
-              <a:t>, LLNL</a:t>
-            </a:r>
-          </a:p>
-          <a:p>
-            <a:pPr lvl="1"/>
-            <a:r>
-              <a:rPr lang="en-US" sz="1600" dirty="0"/>
-              <a:t>Nilabh Roy, Canon Nanotechnologies.</a:t>
-            </a:r>
-          </a:p>
-          <a:p>
-            <a:pPr lvl="1"/>
-            <a:r>
-              <a:rPr lang="en-US" sz="1600" dirty="0"/>
-              <a:t>Stuart T. Smith, University of North Carolina-Charlotte</a:t>
-            </a:r>
-          </a:p>
-          <a:p>
-            <a:pPr lvl="1"/>
-            <a:r>
-              <a:rPr lang="en-US" sz="1600" dirty="0"/>
-              <a:t>Alex Sohn, Facebook Reality Labs</a:t>
-            </a:r>
-          </a:p>
-        </p:txBody>
-      </p:sp>
-      <p:sp>
-        <p:nvSpPr>
-          <p:cNvPr id="4" name="Slide Number Placeholder 3">
-            <a:extLst>
-              <a:ext uri="{FF2B5EF4-FFF2-40B4-BE49-F238E27FC236}">
-                <a16:creationId xmlns:a16="http://schemas.microsoft.com/office/drawing/2014/main" id="{19341587-B5CF-456F-9EE3-16344B728AB2}"/>
-              </a:ext>
-            </a:extLst>
-          </p:cNvPr>
-          <p:cNvSpPr>
-            <a:spLocks noGrp="1"/>
-          </p:cNvSpPr>
-          <p:nvPr>
-            <p:ph type="sldNum" idx="12"/>
-          </p:nvPr>
-        </p:nvSpPr>
-        <p:spPr/>
-        <p:txBody>
-          <a:bodyPr/>
-          <a:lstStyle/>
-          <a:p>
-            <a:pPr marL="0" lvl="0" indent="0" algn="r" rtl="0">
-              <a:spcBef>
-                <a:spcPts val="0"/>
-              </a:spcBef>
-              <a:spcAft>
-                <a:spcPts val="0"/>
-              </a:spcAft>
-              <a:buNone/>
-            </a:pPr>
-            <a:fld id="{00000000-1234-1234-1234-123412341234}" type="slidenum">
-              <a:rPr lang="en" smtClean="0"/>
-              <a:t>8</a:t>
-            </a:fld>
-            <a:endParaRPr lang="en"/>
-          </a:p>
-        </p:txBody>
-      </p:sp>
-      <p:sp>
-        <p:nvSpPr>
-          <p:cNvPr id="5" name="Slide Number Placeholder 4">
-            <a:extLst>
-              <a:ext uri="{FF2B5EF4-FFF2-40B4-BE49-F238E27FC236}">
-                <a16:creationId xmlns:a16="http://schemas.microsoft.com/office/drawing/2014/main" id="{C9D2AB4D-827B-4FC9-AF5E-1096F1C7C0E0}"/>
-              </a:ext>
-            </a:extLst>
-          </p:cNvPr>
-          <p:cNvSpPr>
-            <a:spLocks noGrp="1"/>
-          </p:cNvSpPr>
-          <p:nvPr>
-            <p:ph type="sldNum" idx="2"/>
-          </p:nvPr>
-        </p:nvSpPr>
-        <p:spPr/>
-        <p:txBody>
-          <a:bodyPr/>
-          <a:lstStyle/>
-          <a:p>
-            <a:r>
-              <a:rPr lang="de-DE"/>
-              <a:t>ASPE 2020 Annual Meeting – October 20-23, 2020</a:t>
-            </a:r>
-            <a:endParaRPr lang="de-DE" dirty="0"/>
-          </a:p>
-        </p:txBody>
-      </p:sp>
-    </p:spTree>
-    <p:extLst>
-      <p:ext uri="{BB962C8B-B14F-4D97-AF65-F5344CB8AC3E}">
-        <p14:creationId xmlns:p14="http://schemas.microsoft.com/office/powerpoint/2010/main" val="3703051112"/>
-      </p:ext>
-    </p:extLst>
-  </p:cSld>
-  <p:clrMapOvr>
-    <a:masterClrMapping/>
-  </p:clrMapOvr>
-</p:sld>
-</file>
-
-<file path=ppt/slides/slide9.xml><?xml version="1.0" encoding="utf-8"?>
-<p:sld xmlns:a="http://schemas.openxmlformats.org/drawingml/2006/main" xmlns:r="http://schemas.openxmlformats.org/officeDocument/2006/relationships" xmlns:p="http://schemas.openxmlformats.org/presentationml/2006/main">
-  <p:cSld>
-    <p:spTree>
-      <p:nvGrpSpPr>
-        <p:cNvPr id="1" name=""/>
-        <p:cNvGrpSpPr/>
-        <p:nvPr/>
-      </p:nvGrpSpPr>
-      <p:grpSpPr>
-        <a:xfrm>
-          <a:off x="0" y="0"/>
-          <a:ext cx="0" cy="0"/>
-          <a:chOff x="0" y="0"/>
-          <a:chExt cx="0" cy="0"/>
-        </a:xfrm>
-      </p:grpSpPr>
-      <p:sp>
-        <p:nvSpPr>
           <p:cNvPr id="4" name="Slide Number Placeholder 3">
             <a:extLst>
               <a:ext uri="{FF2B5EF4-FFF2-40B4-BE49-F238E27FC236}">
@@ -6135,7 +5870,7 @@
             </a:pPr>
             <a:fld id="{00000000-1234-1234-1234-123412341234}" type="slidenum">
               <a:rPr lang="en" smtClean="0"/>
-              <a:t>9</a:t>
+              <a:t>8</a:t>
             </a:fld>
             <a:endParaRPr lang="en"/>
           </a:p>

</xml_diff>